<commit_message>
Updated version to 1.2.1
</commit_message>
<xml_diff>
--- a/05-chef_client_run_internals.pptx
+++ b/05-chef_client_run_internals.pptx
@@ -122,7 +122,7 @@
   </p:defaultTextStyle>
   <p:extLst>
     <p:ext uri="{EFAFB233-063F-42B5-8137-9DF3F51BA10A}">
-      <p15:sldGuideLst xmlns:p15="http://schemas.microsoft.com/office/powerpoint/2012/main" xmlns="">
+      <p15:sldGuideLst xmlns:p15="http://schemas.microsoft.com/office/powerpoint/2012/main">
         <p15:guide id="1" orient="horz" pos="2880">
           <p15:clr>
             <a:srgbClr val="A4A3A4"/>
@@ -278,7 +278,7 @@
           <a:p>
             <a:fld id="{1D8BD707-D9CF-40AE-B4C6-C98DA3205C09}" type="datetimeFigureOut">
               <a:rPr lang="en-US"/>
-              <a:t>7/15/15</a:t>
+              <a:t>7/24/2015</a:t>
             </a:fld>
             <a:endParaRPr lang="en-US"/>
           </a:p>
@@ -461,7 +461,7 @@
           <a:p>
             <a:fld id="{1D8BD707-D9CF-40AE-B4C6-C98DA3205C09}" type="datetimeFigureOut">
               <a:rPr lang="en-US"/>
-              <a:t>7/15/15</a:t>
+              <a:t>7/24/2015</a:t>
             </a:fld>
             <a:endParaRPr lang="en-US"/>
           </a:p>
@@ -3834,7 +3834,7 @@
           <a:p>
             <a:fld id="{1D8BD707-D9CF-40AE-B4C6-C98DA3205C09}" type="datetimeFigureOut">
               <a:rPr lang="en-US"/>
-              <a:t>7/15/15</a:t>
+              <a:t>7/24/2015</a:t>
             </a:fld>
             <a:endParaRPr lang="en-US"/>
           </a:p>
@@ -3988,7 +3988,7 @@
           <a:p>
             <a:fld id="{1D8BD707-D9CF-40AE-B4C6-C98DA3205C09}" type="datetimeFigureOut">
               <a:rPr lang="en-US"/>
-              <a:t>7/15/15</a:t>
+              <a:t>7/24/2015</a:t>
             </a:fld>
             <a:endParaRPr lang="en-US"/>
           </a:p>
@@ -7161,7 +7161,7 @@
           <a:p>
             <a:fld id="{1D8BD707-D9CF-40AE-B4C6-C98DA3205C09}" type="datetimeFigureOut">
               <a:rPr lang="en-US"/>
-              <a:t>7/15/15</a:t>
+              <a:t>7/24/2015</a:t>
             </a:fld>
             <a:endParaRPr lang="en-US"/>
           </a:p>
@@ -7442,7 +7442,7 @@
           <a:p>
             <a:fld id="{1D8BD707-D9CF-40AE-B4C6-C98DA3205C09}" type="datetimeFigureOut">
               <a:rPr lang="en-US"/>
-              <a:t>7/15/15</a:t>
+              <a:t>7/24/2015</a:t>
             </a:fld>
             <a:endParaRPr lang="en-US"/>
           </a:p>
@@ -13526,7 +13526,7 @@
                 <a:latin typeface="Arial"/>
                 <a:cs typeface="Arial"/>
               </a:rPr>
-              <a:t>0</a:t>
+              <a:t>1</a:t>
             </a:r>
             <a:endParaRPr sz="1800" dirty="0">
               <a:latin typeface="Arial"/>
@@ -14039,7 +14039,7 @@
   <p:timing>
     <p:tnLst>
       <p:par>
-        <p:cTn xmlns:p14="http://schemas.microsoft.com/office/powerpoint/2010/main" id="1" dur="indefinite" restart="never" nodeType="tmRoot"/>
+        <p:cTn id="1" dur="indefinite" restart="never" nodeType="tmRoot"/>
       </p:par>
     </p:tnLst>
   </p:timing>
@@ -15596,7 +15596,7 @@
   <p:timing>
     <p:tnLst>
       <p:par>
-        <p:cTn xmlns:p14="http://schemas.microsoft.com/office/powerpoint/2010/main" id="1" dur="indefinite" restart="never" nodeType="tmRoot"/>
+        <p:cTn id="1" dur="indefinite" restart="never" nodeType="tmRoot"/>
       </p:par>
     </p:tnLst>
   </p:timing>
@@ -18153,17 +18153,7 @@
                 <a:latin typeface="Courier"/>
                 <a:cs typeface="Courier"/>
               </a:rPr>
-              <a:t>  </a:t>
-            </a:r>
-            <a:r>
-              <a:rPr lang="en-US" sz="2000" dirty="0" smtClean="0">
-                <a:solidFill>
-                  <a:srgbClr val="939393"/>
-                </a:solidFill>
-                <a:latin typeface="Courier"/>
-                <a:cs typeface="Courier"/>
-              </a:rPr>
-              <a:t> action </a:t>
+              <a:t>   action </a:t>
             </a:r>
             <a:r>
               <a:rPr lang="en-US" sz="2000" dirty="0">
@@ -18187,13 +18177,6 @@
               </a:rPr>
               <a:t> end</a:t>
             </a:r>
-            <a:endParaRPr lang="en-US" sz="2000" b="1" dirty="0" smtClean="0">
-              <a:solidFill>
-                <a:srgbClr val="939393"/>
-              </a:solidFill>
-              <a:latin typeface="Courier"/>
-              <a:cs typeface="Courier"/>
-            </a:endParaRPr>
           </a:p>
           <a:p>
             <a:endParaRPr lang="en-US" sz="2000" b="1" dirty="0">
@@ -18285,8 +18268,82 @@
                 <a:latin typeface="Courier"/>
                 <a:cs typeface="Courier"/>
               </a:rPr>
+              <a:t>   block </a:t>
+            </a:r>
+            <a:r>
+              <a:rPr lang="en-US" sz="2000" b="1" dirty="0">
+                <a:solidFill>
+                  <a:srgbClr val="008F00"/>
+                </a:solidFill>
+                <a:latin typeface="Courier"/>
+                <a:cs typeface="Courier"/>
+              </a:rPr>
+              <a:t>do</a:t>
+            </a:r>
+          </a:p>
+          <a:p>
+            <a:r>
+              <a:rPr lang="en-US" sz="2000" b="1" dirty="0" smtClean="0">
+                <a:solidFill>
+                  <a:srgbClr val="008F00"/>
+                </a:solidFill>
+                <a:latin typeface="Courier"/>
+                <a:cs typeface="Courier"/>
+              </a:rPr>
+              <a:t>     if </a:t>
+            </a:r>
+            <a:r>
+              <a:rPr lang="en-US" sz="2000" dirty="0" err="1">
+                <a:solidFill>
+                  <a:srgbClr val="9C1300"/>
+                </a:solidFill>
+                <a:latin typeface="Courier"/>
+                <a:cs typeface="Courier"/>
+              </a:rPr>
+              <a:t>Random</a:t>
+            </a:r>
+            <a:r>
+              <a:rPr lang="en-US" sz="2000" dirty="0" err="1">
+                <a:solidFill>
+                  <a:srgbClr val="7A7A7A"/>
+                </a:solidFill>
+                <a:latin typeface="Courier"/>
+                <a:cs typeface="Courier"/>
+              </a:rPr>
+              <a:t>.</a:t>
+            </a:r>
+            <a:r>
+              <a:rPr lang="en-US" sz="2000" dirty="0" err="1">
+                <a:solidFill>
+                  <a:srgbClr val="000000"/>
+                </a:solidFill>
+                <a:latin typeface="Courier"/>
+                <a:cs typeface="Courier"/>
+              </a:rPr>
+              <a:t>rand</a:t>
+            </a:r>
+            <a:r>
+              <a:rPr lang="en-US" sz="2000" dirty="0">
+                <a:solidFill>
+                  <a:srgbClr val="000000"/>
+                </a:solidFill>
+                <a:latin typeface="Courier"/>
+                <a:cs typeface="Courier"/>
+              </a:rPr>
               <a:t> </a:t>
             </a:r>
+            <a:r>
+              <a:rPr lang="en-US" sz="2000" dirty="0">
+                <a:solidFill>
+                  <a:srgbClr val="7A7A7A"/>
+                </a:solidFill>
+                <a:latin typeface="Courier"/>
+                <a:cs typeface="Courier"/>
+              </a:rPr>
+              <a:t>&gt; 0.5</a:t>
+            </a:r>
+          </a:p>
+          <a:p>
             <a:r>
               <a:rPr lang="en-US" sz="2000" dirty="0" smtClean="0">
                 <a:solidFill>
@@ -18295,17 +18352,117 @@
                 <a:latin typeface="Courier"/>
                 <a:cs typeface="Courier"/>
               </a:rPr>
-              <a:t>  block </a:t>
-            </a:r>
-            <a:r>
-              <a:rPr lang="en-US" sz="2000" b="1" dirty="0">
+              <a:t>       </a:t>
+            </a:r>
+            <a:r>
+              <a:rPr lang="en-US" sz="2000" dirty="0" err="1" smtClean="0">
                 <a:solidFill>
-                  <a:srgbClr val="008F00"/>
+                  <a:srgbClr val="000000"/>
                 </a:solidFill>
                 <a:latin typeface="Courier"/>
                 <a:cs typeface="Courier"/>
               </a:rPr>
-              <a:t>do</a:t>
+              <a:t>node</a:t>
+            </a:r>
+            <a:r>
+              <a:rPr lang="en-US" sz="2000" dirty="0" err="1" smtClean="0">
+                <a:solidFill>
+                  <a:srgbClr val="7A7A7A"/>
+                </a:solidFill>
+                <a:latin typeface="Courier"/>
+                <a:cs typeface="Courier"/>
+              </a:rPr>
+              <a:t>.</a:t>
+            </a:r>
+            <a:r>
+              <a:rPr lang="en-US" sz="2000" dirty="0" err="1" smtClean="0">
+                <a:solidFill>
+                  <a:srgbClr val="000000"/>
+                </a:solidFill>
+                <a:latin typeface="Courier"/>
+                <a:cs typeface="Courier"/>
+              </a:rPr>
+              <a:t>run_state</a:t>
+            </a:r>
+            <a:r>
+              <a:rPr lang="en-US" sz="2000" dirty="0">
+                <a:solidFill>
+                  <a:srgbClr val="7A7A7A"/>
+                </a:solidFill>
+                <a:latin typeface="Courier"/>
+                <a:cs typeface="Courier"/>
+              </a:rPr>
+              <a:t>[</a:t>
+            </a:r>
+            <a:r>
+              <a:rPr lang="en-US" sz="2000" dirty="0">
+                <a:solidFill>
+                  <a:srgbClr val="C9352B"/>
+                </a:solidFill>
+                <a:latin typeface="Courier"/>
+                <a:cs typeface="Courier"/>
+              </a:rPr>
+              <a:t>'</a:t>
+            </a:r>
+            <a:r>
+              <a:rPr lang="en-US" sz="2000" dirty="0" err="1">
+                <a:solidFill>
+                  <a:srgbClr val="C9352B"/>
+                </a:solidFill>
+                <a:latin typeface="Courier"/>
+                <a:cs typeface="Courier"/>
+              </a:rPr>
+              <a:t>scripting_language</a:t>
+            </a:r>
+            <a:r>
+              <a:rPr lang="en-US" sz="2000" dirty="0">
+                <a:solidFill>
+                  <a:srgbClr val="C9352B"/>
+                </a:solidFill>
+                <a:latin typeface="Courier"/>
+                <a:cs typeface="Courier"/>
+              </a:rPr>
+              <a:t>'</a:t>
+            </a:r>
+            <a:r>
+              <a:rPr lang="en-US" sz="2000" dirty="0">
+                <a:solidFill>
+                  <a:srgbClr val="7A7A7A"/>
+                </a:solidFill>
+                <a:latin typeface="Courier"/>
+                <a:cs typeface="Courier"/>
+              </a:rPr>
+              <a:t>] = </a:t>
+            </a:r>
+            <a:r>
+              <a:rPr lang="en-US" sz="2000" dirty="0">
+                <a:solidFill>
+                  <a:srgbClr val="C9352B"/>
+                </a:solidFill>
+                <a:latin typeface="Courier"/>
+                <a:cs typeface="Courier"/>
+              </a:rPr>
+              <a:t>'</a:t>
+            </a:r>
+            <a:r>
+              <a:rPr lang="en-US" sz="2000" dirty="0" err="1">
+                <a:solidFill>
+                  <a:srgbClr val="C9352B"/>
+                </a:solidFill>
+                <a:latin typeface="Courier"/>
+                <a:cs typeface="Courier"/>
+              </a:rPr>
+              <a:t>php</a:t>
+            </a:r>
+            <a:r>
+              <a:rPr lang="en-US" sz="2000" dirty="0">
+                <a:solidFill>
+                  <a:srgbClr val="C9352B"/>
+                </a:solidFill>
+                <a:latin typeface="Courier"/>
+                <a:cs typeface="Courier"/>
+              </a:rPr>
+              <a:t>'</a:t>
             </a:r>
           </a:p>
           <a:p>
@@ -18317,221 +18474,7 @@
                 <a:latin typeface="Courier"/>
                 <a:cs typeface="Courier"/>
               </a:rPr>
-              <a:t>  </a:t>
-            </a:r>
-            <a:r>
-              <a:rPr lang="en-US" sz="2000" b="1" dirty="0" smtClean="0">
-                <a:solidFill>
-                  <a:srgbClr val="008F00"/>
-                </a:solidFill>
-                <a:latin typeface="Courier"/>
-                <a:cs typeface="Courier"/>
-              </a:rPr>
-              <a:t>   if </a:t>
-            </a:r>
-            <a:r>
-              <a:rPr lang="en-US" sz="2000" dirty="0" err="1">
-                <a:solidFill>
-                  <a:srgbClr val="9C1300"/>
-                </a:solidFill>
-                <a:latin typeface="Courier"/>
-                <a:cs typeface="Courier"/>
-              </a:rPr>
-              <a:t>Random</a:t>
-            </a:r>
-            <a:r>
-              <a:rPr lang="en-US" sz="2000" dirty="0" err="1">
-                <a:solidFill>
-                  <a:srgbClr val="7A7A7A"/>
-                </a:solidFill>
-                <a:latin typeface="Courier"/>
-                <a:cs typeface="Courier"/>
-              </a:rPr>
-              <a:t>.</a:t>
-            </a:r>
-            <a:r>
-              <a:rPr lang="en-US" sz="2000" dirty="0" err="1">
-                <a:solidFill>
-                  <a:srgbClr val="000000"/>
-                </a:solidFill>
-                <a:latin typeface="Courier"/>
-                <a:cs typeface="Courier"/>
-              </a:rPr>
-              <a:t>rand</a:t>
-            </a:r>
-            <a:r>
-              <a:rPr lang="en-US" sz="2000" dirty="0">
-                <a:solidFill>
-                  <a:srgbClr val="000000"/>
-                </a:solidFill>
-                <a:latin typeface="Courier"/>
-                <a:cs typeface="Courier"/>
-              </a:rPr>
-              <a:t> </a:t>
-            </a:r>
-            <a:r>
-              <a:rPr lang="en-US" sz="2000" dirty="0">
-                <a:solidFill>
-                  <a:srgbClr val="7A7A7A"/>
-                </a:solidFill>
-                <a:latin typeface="Courier"/>
-                <a:cs typeface="Courier"/>
-              </a:rPr>
-              <a:t>&gt; 0.5</a:t>
-            </a:r>
-          </a:p>
-          <a:p>
-            <a:r>
-              <a:rPr lang="en-US" sz="2000" dirty="0" smtClean="0">
-                <a:solidFill>
-                  <a:srgbClr val="000000"/>
-                </a:solidFill>
-                <a:latin typeface="Courier"/>
-                <a:cs typeface="Courier"/>
-              </a:rPr>
-              <a:t>     </a:t>
-            </a:r>
-            <a:r>
-              <a:rPr lang="en-US" sz="2000" dirty="0" smtClean="0">
-                <a:solidFill>
-                  <a:srgbClr val="000000"/>
-                </a:solidFill>
-                <a:latin typeface="Courier"/>
-                <a:cs typeface="Courier"/>
-              </a:rPr>
-              <a:t>  </a:t>
-            </a:r>
-            <a:r>
-              <a:rPr lang="en-US" sz="2000" dirty="0" err="1" smtClean="0">
-                <a:solidFill>
-                  <a:srgbClr val="000000"/>
-                </a:solidFill>
-                <a:latin typeface="Courier"/>
-                <a:cs typeface="Courier"/>
-              </a:rPr>
-              <a:t>node</a:t>
-            </a:r>
-            <a:r>
-              <a:rPr lang="en-US" sz="2000" dirty="0" err="1" smtClean="0">
-                <a:solidFill>
-                  <a:srgbClr val="7A7A7A"/>
-                </a:solidFill>
-                <a:latin typeface="Courier"/>
-                <a:cs typeface="Courier"/>
-              </a:rPr>
-              <a:t>.</a:t>
-            </a:r>
-            <a:r>
-              <a:rPr lang="en-US" sz="2000" dirty="0" err="1" smtClean="0">
-                <a:solidFill>
-                  <a:srgbClr val="000000"/>
-                </a:solidFill>
-                <a:latin typeface="Courier"/>
-                <a:cs typeface="Courier"/>
-              </a:rPr>
-              <a:t>run_state</a:t>
-            </a:r>
-            <a:r>
-              <a:rPr lang="en-US" sz="2000" dirty="0">
-                <a:solidFill>
-                  <a:srgbClr val="7A7A7A"/>
-                </a:solidFill>
-                <a:latin typeface="Courier"/>
-                <a:cs typeface="Courier"/>
-              </a:rPr>
-              <a:t>[</a:t>
-            </a:r>
-            <a:r>
-              <a:rPr lang="en-US" sz="2000" dirty="0">
-                <a:solidFill>
-                  <a:srgbClr val="C9352B"/>
-                </a:solidFill>
-                <a:latin typeface="Courier"/>
-                <a:cs typeface="Courier"/>
-              </a:rPr>
-              <a:t>'</a:t>
-            </a:r>
-            <a:r>
-              <a:rPr lang="en-US" sz="2000" dirty="0" err="1">
-                <a:solidFill>
-                  <a:srgbClr val="C9352B"/>
-                </a:solidFill>
-                <a:latin typeface="Courier"/>
-                <a:cs typeface="Courier"/>
-              </a:rPr>
-              <a:t>scripting_language</a:t>
-            </a:r>
-            <a:r>
-              <a:rPr lang="en-US" sz="2000" dirty="0">
-                <a:solidFill>
-                  <a:srgbClr val="C9352B"/>
-                </a:solidFill>
-                <a:latin typeface="Courier"/>
-                <a:cs typeface="Courier"/>
-              </a:rPr>
-              <a:t>'</a:t>
-            </a:r>
-            <a:r>
-              <a:rPr lang="en-US" sz="2000" dirty="0">
-                <a:solidFill>
-                  <a:srgbClr val="7A7A7A"/>
-                </a:solidFill>
-                <a:latin typeface="Courier"/>
-                <a:cs typeface="Courier"/>
-              </a:rPr>
-              <a:t>] = </a:t>
-            </a:r>
-            <a:r>
-              <a:rPr lang="en-US" sz="2000" dirty="0">
-                <a:solidFill>
-                  <a:srgbClr val="C9352B"/>
-                </a:solidFill>
-                <a:latin typeface="Courier"/>
-                <a:cs typeface="Courier"/>
-              </a:rPr>
-              <a:t>'</a:t>
-            </a:r>
-            <a:r>
-              <a:rPr lang="en-US" sz="2000" dirty="0" err="1">
-                <a:solidFill>
-                  <a:srgbClr val="C9352B"/>
-                </a:solidFill>
-                <a:latin typeface="Courier"/>
-                <a:cs typeface="Courier"/>
-              </a:rPr>
-              <a:t>php</a:t>
-            </a:r>
-            <a:r>
-              <a:rPr lang="en-US" sz="2000" dirty="0">
-                <a:solidFill>
-                  <a:srgbClr val="C9352B"/>
-                </a:solidFill>
-                <a:latin typeface="Courier"/>
-                <a:cs typeface="Courier"/>
-              </a:rPr>
-              <a:t>'</a:t>
-            </a:r>
-          </a:p>
-          <a:p>
-            <a:r>
-              <a:rPr lang="en-US" sz="2000" b="1" dirty="0" smtClean="0">
-                <a:solidFill>
-                  <a:srgbClr val="008F00"/>
-                </a:solidFill>
-                <a:latin typeface="Courier"/>
-                <a:cs typeface="Courier"/>
-              </a:rPr>
-              <a:t>     </a:t>
-            </a:r>
-            <a:r>
-              <a:rPr lang="en-US" sz="2000" b="1" dirty="0" smtClean="0">
-                <a:solidFill>
-                  <a:srgbClr val="008F00"/>
-                </a:solidFill>
-                <a:latin typeface="Courier"/>
-                <a:cs typeface="Courier"/>
-              </a:rPr>
-              <a:t>else</a:t>
+              <a:t>     else</a:t>
             </a:r>
             <a:endParaRPr lang="en-US" sz="2000" b="1" dirty="0">
               <a:solidFill>
@@ -18550,17 +18493,7 @@
                 <a:latin typeface="Courier"/>
                 <a:cs typeface="Courier"/>
               </a:rPr>
-              <a:t>     </a:t>
-            </a:r>
-            <a:r>
-              <a:rPr lang="en-US" sz="2000" dirty="0" smtClean="0">
-                <a:solidFill>
-                  <a:srgbClr val="000000"/>
-                </a:solidFill>
-                <a:latin typeface="Courier"/>
-                <a:cs typeface="Courier"/>
-              </a:rPr>
-              <a:t>  </a:t>
+              <a:t>       </a:t>
             </a:r>
             <a:r>
               <a:rPr lang="en-US" sz="2000" dirty="0" err="1" smtClean="0">
@@ -18682,17 +18615,7 @@
                 <a:latin typeface="Courier"/>
                 <a:cs typeface="Courier"/>
               </a:rPr>
-              <a:t>    </a:t>
-            </a:r>
-            <a:r>
-              <a:rPr lang="en-US" sz="2000" b="1" dirty="0" smtClean="0">
-                <a:solidFill>
-                  <a:srgbClr val="008F00"/>
-                </a:solidFill>
-                <a:latin typeface="Courier"/>
-                <a:cs typeface="Courier"/>
-              </a:rPr>
-              <a:t> end</a:t>
+              <a:t>     end</a:t>
             </a:r>
             <a:endParaRPr lang="en-US" sz="2000" b="1" dirty="0">
               <a:solidFill>
@@ -19198,7 +19121,7 @@
   <p:timing>
     <p:tnLst>
       <p:par>
-        <p:cTn xmlns:p14="http://schemas.microsoft.com/office/powerpoint/2010/main" id="1" dur="indefinite" restart="never" nodeType="tmRoot"/>
+        <p:cTn id="1" dur="indefinite" restart="never" nodeType="tmRoot"/>
       </p:par>
     </p:tnLst>
   </p:timing>
@@ -22363,17 +22286,7 @@
                 <a:latin typeface="Courier"/>
                 <a:cs typeface="Courier"/>
               </a:rPr>
-              <a:t> </a:t>
-            </a:r>
-            <a:r>
-              <a:rPr lang="en-US" sz="2400" b="1" dirty="0" smtClean="0">
-                <a:solidFill>
-                  <a:srgbClr val="008F00"/>
-                </a:solidFill>
-                <a:latin typeface="Courier"/>
-                <a:cs typeface="Courier"/>
-              </a:rPr>
-              <a:t>if </a:t>
+              <a:t> if </a:t>
             </a:r>
             <a:r>
               <a:rPr lang="en-US" sz="2400" dirty="0" err="1">
@@ -22435,17 +22348,7 @@
                 <a:latin typeface="Courier"/>
                 <a:cs typeface="Courier"/>
               </a:rPr>
-              <a:t>     </a:t>
-            </a:r>
-            <a:r>
-              <a:rPr lang="en-US" sz="2400" dirty="0" smtClean="0">
-                <a:solidFill>
-                  <a:srgbClr val="000000"/>
-                </a:solidFill>
-                <a:latin typeface="Courier"/>
-                <a:cs typeface="Courier"/>
-              </a:rPr>
-              <a:t>  </a:t>
+              <a:t>       </a:t>
             </a:r>
             <a:r>
               <a:rPr lang="en-US" sz="2400" dirty="0" err="1" smtClean="0">
@@ -22577,17 +22480,7 @@
                 <a:latin typeface="Courier"/>
                 <a:cs typeface="Courier"/>
               </a:rPr>
-              <a:t>   </a:t>
-            </a:r>
-            <a:r>
-              <a:rPr lang="en-US" sz="2400" b="1" dirty="0" smtClean="0">
-                <a:solidFill>
-                  <a:srgbClr val="C9352B"/>
-                </a:solidFill>
-                <a:latin typeface="Courier"/>
-                <a:cs typeface="Courier"/>
-              </a:rPr>
-              <a:t> </a:t>
+              <a:t>    </a:t>
             </a:r>
             <a:r>
               <a:rPr lang="en-US" sz="2400" b="1" dirty="0" smtClean="0">
@@ -22616,17 +22509,7 @@
                 <a:latin typeface="Courier"/>
                 <a:cs typeface="Courier"/>
               </a:rPr>
-              <a:t>      </a:t>
-            </a:r>
-            <a:r>
-              <a:rPr lang="en-US" sz="2400" dirty="0" smtClean="0">
-                <a:solidFill>
-                  <a:srgbClr val="000000"/>
-                </a:solidFill>
-                <a:latin typeface="Courier"/>
-                <a:cs typeface="Courier"/>
-              </a:rPr>
-              <a:t> </a:t>
+              <a:t>       </a:t>
             </a:r>
             <a:r>
               <a:rPr lang="en-US" sz="2400" dirty="0" err="1" smtClean="0">
@@ -22748,17 +22631,7 @@
                 <a:latin typeface="Courier"/>
                 <a:cs typeface="Courier"/>
               </a:rPr>
-              <a:t>     </a:t>
-            </a:r>
-            <a:r>
-              <a:rPr lang="en-US" sz="2400" b="1" dirty="0" smtClean="0">
-                <a:solidFill>
-                  <a:srgbClr val="008F00"/>
-                </a:solidFill>
-                <a:latin typeface="Courier"/>
-                <a:cs typeface="Courier"/>
-              </a:rPr>
-              <a:t>end</a:t>
+              <a:t>     end</a:t>
             </a:r>
             <a:endParaRPr lang="en-US" sz="2400" b="1" dirty="0">
               <a:solidFill>
@@ -23276,7 +23149,7 @@
   <p:timing>
     <p:tnLst>
       <p:par>
-        <p:cTn xmlns:p14="http://schemas.microsoft.com/office/powerpoint/2010/main" id="1" dur="indefinite" restart="never" nodeType="tmRoot"/>
+        <p:cTn id="1" dur="indefinite" restart="never" nodeType="tmRoot"/>
       </p:par>
     </p:tnLst>
   </p:timing>
@@ -26712,7 +26585,7 @@
   <p:timing>
     <p:tnLst>
       <p:par>
-        <p:cTn xmlns:p14="http://schemas.microsoft.com/office/powerpoint/2010/main" id="1" dur="indefinite" restart="never" nodeType="tmRoot"/>
+        <p:cTn id="1" dur="indefinite" restart="never" nodeType="tmRoot"/>
       </p:par>
     </p:tnLst>
   </p:timing>
@@ -30159,7 +30032,7 @@
   <p:timing>
     <p:tnLst>
       <p:par>
-        <p:cTn xmlns:p14="http://schemas.microsoft.com/office/powerpoint/2010/main" id="1" dur="indefinite" restart="never" nodeType="tmRoot"/>
+        <p:cTn id="1" dur="indefinite" restart="never" nodeType="tmRoot"/>
       </p:par>
     </p:tnLst>
   </p:timing>
@@ -31338,7 +31211,7 @@
   <p:timing>
     <p:tnLst>
       <p:par>
-        <p:cTn xmlns:p14="http://schemas.microsoft.com/office/powerpoint/2010/main" id="1" dur="indefinite" restart="never" nodeType="tmRoot"/>
+        <p:cTn id="1" dur="indefinite" restart="never" nodeType="tmRoot"/>
       </p:par>
     </p:tnLst>
   </p:timing>
@@ -34925,7 +34798,7 @@
   <p:timing>
     <p:tnLst>
       <p:par>
-        <p:cTn xmlns:p14="http://schemas.microsoft.com/office/powerpoint/2010/main" id="1" dur="indefinite" restart="never" nodeType="tmRoot"/>
+        <p:cTn id="1" dur="indefinite" restart="never" nodeType="tmRoot"/>
       </p:par>
     </p:tnLst>
   </p:timing>
@@ -38653,7 +38526,7 @@
   <p:timing>
     <p:tnLst>
       <p:par>
-        <p:cTn xmlns:p14="http://schemas.microsoft.com/office/powerpoint/2010/main" id="1" dur="indefinite" restart="never" nodeType="tmRoot"/>
+        <p:cTn id="1" dur="indefinite" restart="never" nodeType="tmRoot"/>
       </p:par>
     </p:tnLst>
   </p:timing>
@@ -42610,7 +42483,7 @@
   <p:timing>
     <p:tnLst>
       <p:par>
-        <p:cTn xmlns:p14="http://schemas.microsoft.com/office/powerpoint/2010/main" id="1" dur="indefinite" restart="never" nodeType="tmRoot"/>
+        <p:cTn id="1" dur="indefinite" restart="never" nodeType="tmRoot"/>
       </p:par>
     </p:tnLst>
   </p:timing>
@@ -43757,7 +43630,7 @@
   <p:timing>
     <p:tnLst>
       <p:par>
-        <p:cTn xmlns:p14="http://schemas.microsoft.com/office/powerpoint/2010/main" id="1" dur="indefinite" restart="never" nodeType="tmRoot"/>
+        <p:cTn id="1" dur="indefinite" restart="never" nodeType="tmRoot"/>
       </p:par>
     </p:tnLst>
   </p:timing>
@@ -47233,7 +47106,7 @@
   <p:timing>
     <p:tnLst>
       <p:par>
-        <p:cTn xmlns:p14="http://schemas.microsoft.com/office/powerpoint/2010/main" id="1" dur="indefinite" restart="never" nodeType="tmRoot"/>
+        <p:cTn id="1" dur="indefinite" restart="never" nodeType="tmRoot"/>
       </p:par>
     </p:tnLst>
   </p:timing>
@@ -50772,7 +50645,7 @@
   <p:timing>
     <p:tnLst>
       <p:par>
-        <p:cTn xmlns:p14="http://schemas.microsoft.com/office/powerpoint/2010/main" id="1" dur="indefinite" restart="never" nodeType="tmRoot"/>
+        <p:cTn id="1" dur="indefinite" restart="never" nodeType="tmRoot"/>
       </p:par>
     </p:tnLst>
   </p:timing>
@@ -54283,7 +54156,7 @@
   <p:timing>
     <p:tnLst>
       <p:par>
-        <p:cTn xmlns:p14="http://schemas.microsoft.com/office/powerpoint/2010/main" id="1" dur="indefinite" restart="never" nodeType="tmRoot"/>
+        <p:cTn id="1" dur="indefinite" restart="never" nodeType="tmRoot"/>
       </p:par>
     </p:tnLst>
   </p:timing>
@@ -58044,7 +57917,7 @@
   <p:timing>
     <p:tnLst>
       <p:par>
-        <p:cTn xmlns:p14="http://schemas.microsoft.com/office/powerpoint/2010/main" id="1" dur="indefinite" restart="never" nodeType="tmRoot"/>
+        <p:cTn id="1" dur="indefinite" restart="never" nodeType="tmRoot"/>
       </p:par>
     </p:tnLst>
   </p:timing>
@@ -61849,7 +61722,7 @@
   <p:timing>
     <p:tnLst>
       <p:par>
-        <p:cTn xmlns:p14="http://schemas.microsoft.com/office/powerpoint/2010/main" id="1" dur="indefinite" restart="never" nodeType="tmRoot"/>
+        <p:cTn id="1" dur="indefinite" restart="never" nodeType="tmRoot"/>
       </p:par>
     </p:tnLst>
   </p:timing>
@@ -65427,7 +65300,7 @@
   <p:timing>
     <p:tnLst>
       <p:par>
-        <p:cTn xmlns:p14="http://schemas.microsoft.com/office/powerpoint/2010/main" id="1" dur="indefinite" restart="never" nodeType="tmRoot"/>
+        <p:cTn id="1" dur="indefinite" restart="never" nodeType="tmRoot"/>
       </p:par>
     </p:tnLst>
   </p:timing>

</xml_diff>